<commit_message>
Add a lot of Stuff
</commit_message>
<xml_diff>
--- a/documents/projectmanagement/Praesentationen/Führungsstil.pptx
+++ b/documents/projectmanagement/Praesentationen/Führungsstil.pptx
@@ -203,7 +203,7 @@
           <a:p>
             <a:fld id="{BC5D3495-D642-4B9C-A4D9-ABBA71EA56ED}" type="datetimeFigureOut">
               <a:rPr lang="de-DE" smtClean="0"/>
-              <a:t>29.08.2016</a:t>
+              <a:t>30.08.2016</a:t>
             </a:fld>
             <a:endParaRPr lang="de-DE"/>
           </a:p>
@@ -734,7 +734,7 @@
           <a:p>
             <a:fld id="{939A55D9-6AB2-4364-AE5A-4B2CFFB043C1}" type="datetimeFigureOut">
               <a:rPr lang="de-DE" smtClean="0"/>
-              <a:t>29.08.2016</a:t>
+              <a:t>30.08.2016</a:t>
             </a:fld>
             <a:endParaRPr lang="de-DE"/>
           </a:p>
@@ -902,7 +902,7 @@
           <a:p>
             <a:fld id="{939A55D9-6AB2-4364-AE5A-4B2CFFB043C1}" type="datetimeFigureOut">
               <a:rPr lang="de-DE" smtClean="0"/>
-              <a:t>29.08.2016</a:t>
+              <a:t>30.08.2016</a:t>
             </a:fld>
             <a:endParaRPr lang="de-DE"/>
           </a:p>
@@ -1080,7 +1080,7 @@
           <a:p>
             <a:fld id="{939A55D9-6AB2-4364-AE5A-4B2CFFB043C1}" type="datetimeFigureOut">
               <a:rPr lang="de-DE" smtClean="0"/>
-              <a:t>29.08.2016</a:t>
+              <a:t>30.08.2016</a:t>
             </a:fld>
             <a:endParaRPr lang="de-DE"/>
           </a:p>
@@ -1248,7 +1248,7 @@
           <a:p>
             <a:fld id="{939A55D9-6AB2-4364-AE5A-4B2CFFB043C1}" type="datetimeFigureOut">
               <a:rPr lang="de-DE" smtClean="0"/>
-              <a:t>29.08.2016</a:t>
+              <a:t>30.08.2016</a:t>
             </a:fld>
             <a:endParaRPr lang="de-DE"/>
           </a:p>
@@ -1493,7 +1493,7 @@
           <a:p>
             <a:fld id="{939A55D9-6AB2-4364-AE5A-4B2CFFB043C1}" type="datetimeFigureOut">
               <a:rPr lang="de-DE" smtClean="0"/>
-              <a:t>29.08.2016</a:t>
+              <a:t>30.08.2016</a:t>
             </a:fld>
             <a:endParaRPr lang="de-DE"/>
           </a:p>
@@ -1722,7 +1722,7 @@
           <a:p>
             <a:fld id="{939A55D9-6AB2-4364-AE5A-4B2CFFB043C1}" type="datetimeFigureOut">
               <a:rPr lang="de-DE" smtClean="0"/>
-              <a:t>29.08.2016</a:t>
+              <a:t>30.08.2016</a:t>
             </a:fld>
             <a:endParaRPr lang="de-DE"/>
           </a:p>
@@ -2086,7 +2086,7 @@
           <a:p>
             <a:fld id="{939A55D9-6AB2-4364-AE5A-4B2CFFB043C1}" type="datetimeFigureOut">
               <a:rPr lang="de-DE" smtClean="0"/>
-              <a:t>29.08.2016</a:t>
+              <a:t>30.08.2016</a:t>
             </a:fld>
             <a:endParaRPr lang="de-DE"/>
           </a:p>
@@ -2203,7 +2203,7 @@
           <a:p>
             <a:fld id="{939A55D9-6AB2-4364-AE5A-4B2CFFB043C1}" type="datetimeFigureOut">
               <a:rPr lang="de-DE" smtClean="0"/>
-              <a:t>29.08.2016</a:t>
+              <a:t>30.08.2016</a:t>
             </a:fld>
             <a:endParaRPr lang="de-DE"/>
           </a:p>
@@ -2298,7 +2298,7 @@
           <a:p>
             <a:fld id="{939A55D9-6AB2-4364-AE5A-4B2CFFB043C1}" type="datetimeFigureOut">
               <a:rPr lang="de-DE" smtClean="0"/>
-              <a:t>29.08.2016</a:t>
+              <a:t>30.08.2016</a:t>
             </a:fld>
             <a:endParaRPr lang="de-DE"/>
           </a:p>
@@ -2573,7 +2573,7 @@
           <a:p>
             <a:fld id="{939A55D9-6AB2-4364-AE5A-4B2CFFB043C1}" type="datetimeFigureOut">
               <a:rPr lang="de-DE" smtClean="0"/>
-              <a:t>29.08.2016</a:t>
+              <a:t>30.08.2016</a:t>
             </a:fld>
             <a:endParaRPr lang="de-DE"/>
           </a:p>
@@ -2825,7 +2825,7 @@
           <a:p>
             <a:fld id="{939A55D9-6AB2-4364-AE5A-4B2CFFB043C1}" type="datetimeFigureOut">
               <a:rPr lang="de-DE" smtClean="0"/>
-              <a:t>29.08.2016</a:t>
+              <a:t>30.08.2016</a:t>
             </a:fld>
             <a:endParaRPr lang="de-DE"/>
           </a:p>
@@ -3036,7 +3036,7 @@
           <a:p>
             <a:fld id="{939A55D9-6AB2-4364-AE5A-4B2CFFB043C1}" type="datetimeFigureOut">
               <a:rPr lang="de-DE" smtClean="0"/>
-              <a:t>29.08.2016</a:t>
+              <a:t>30.08.2016</a:t>
             </a:fld>
             <a:endParaRPr lang="de-DE"/>
           </a:p>
@@ -3770,7 +3770,7 @@
             <a:pPr algn="l"/>
             <a:r>
               <a:rPr lang="de-DE" sz="5400" dirty="0"/>
-              <a:t>Design</a:t>
+              <a:t>Führungsstil</a:t>
             </a:r>
           </a:p>
         </p:txBody>

</xml_diff>